<commit_message>
Stated in previous push: Using hashmaps on pacman. Pushing presentation.  At about 15 pages.  Have a look and add any difficulties or things of interest you encountered (between the approach and the result section, preferably)
</commit_message>
<xml_diff>
--- a/CS 113 Final Project.pptx
+++ b/CS 113 Final Project.pptx
@@ -11,10 +11,15 @@
     <p:sldId id="259" r:id="rId5"/>
     <p:sldId id="263" r:id="rId6"/>
     <p:sldId id="264" r:id="rId7"/>
-    <p:sldId id="265" r:id="rId8"/>
-    <p:sldId id="260" r:id="rId9"/>
-    <p:sldId id="261" r:id="rId10"/>
-    <p:sldId id="262" r:id="rId11"/>
+    <p:sldId id="266" r:id="rId8"/>
+    <p:sldId id="267" r:id="rId9"/>
+    <p:sldId id="268" r:id="rId10"/>
+    <p:sldId id="269" r:id="rId11"/>
+    <p:sldId id="270" r:id="rId12"/>
+    <p:sldId id="271" r:id="rId13"/>
+    <p:sldId id="260" r:id="rId14"/>
+    <p:sldId id="261" r:id="rId15"/>
+    <p:sldId id="262" r:id="rId16"/>
   </p:sldIdLst>
   <p:sldSz cx="12192000" cy="6858000"/>
   <p:notesSz cx="6858000" cy="9144000"/>
@@ -132,7 +137,12 @@
             <p14:sldId id="259"/>
             <p14:sldId id="263"/>
             <p14:sldId id="264"/>
-            <p14:sldId id="265"/>
+            <p14:sldId id="266"/>
+            <p14:sldId id="267"/>
+            <p14:sldId id="268"/>
+            <p14:sldId id="269"/>
+            <p14:sldId id="270"/>
+            <p14:sldId id="271"/>
           </p14:sldIdLst>
         </p14:section>
         <p14:section name="The result" id="{EEDCA5B2-0F8B-4750-92C8-D9461D5EF7D2}">
@@ -143,6 +153,9 @@
           </p14:sldIdLst>
         </p14:section>
       </p14:sectionLst>
+    </p:ext>
+    <p:ext uri="{EFAFB233-063F-42B5-8137-9DF3F51BA10A}">
+      <p15:sldGuideLst xmlns:p15="http://schemas.microsoft.com/office/powerpoint/2012/main"/>
     </p:ext>
   </p:extLst>
 </p:presentation>
@@ -6151,6 +6164,661 @@
           <a:p>
             <a:r>
               <a:rPr lang="en-US" dirty="0" smtClean="0"/>
+              <a:t>The approach</a:t>
+            </a:r>
+            <a:endParaRPr lang="en-US" dirty="0"/>
+          </a:p>
+        </p:txBody>
+      </p:sp>
+      <p:sp>
+        <p:nvSpPr>
+          <p:cNvPr id="3" name="Content Placeholder 2"/>
+          <p:cNvSpPr>
+            <a:spLocks noGrp="1"/>
+          </p:cNvSpPr>
+          <p:nvPr>
+            <p:ph idx="1"/>
+          </p:nvPr>
+        </p:nvSpPr>
+        <p:spPr/>
+        <p:txBody>
+          <a:bodyPr>
+            <a:normAutofit fontScale="92500" lnSpcReduction="20000"/>
+          </a:bodyPr>
+          <a:lstStyle/>
+          <a:p>
+            <a:r>
+              <a:rPr lang="en-US" dirty="0" smtClean="0"/>
+              <a:t>Data Structures Used:</a:t>
+            </a:r>
+          </a:p>
+          <a:p>
+            <a:pPr lvl="1"/>
+            <a:r>
+              <a:rPr lang="en-US" dirty="0" smtClean="0"/>
+              <a:t>Arrays.</a:t>
+            </a:r>
+          </a:p>
+          <a:p>
+            <a:pPr lvl="2"/>
+            <a:r>
+              <a:rPr lang="en-US" dirty="0" smtClean="0"/>
+              <a:t>Buried in there, somewhere.</a:t>
+            </a:r>
+          </a:p>
+          <a:p>
+            <a:pPr lvl="1"/>
+            <a:r>
+              <a:rPr lang="en-US" dirty="0" err="1" smtClean="0"/>
+              <a:t>ArrayLists</a:t>
+            </a:r>
+            <a:r>
+              <a:rPr lang="en-US" dirty="0" smtClean="0"/>
+              <a:t>, lots of </a:t>
+            </a:r>
+            <a:r>
+              <a:rPr lang="en-US" dirty="0" err="1" smtClean="0"/>
+              <a:t>ArrayLists</a:t>
+            </a:r>
+            <a:r>
+              <a:rPr lang="en-US" dirty="0" smtClean="0"/>
+              <a:t>.</a:t>
+            </a:r>
+          </a:p>
+          <a:p>
+            <a:pPr lvl="2"/>
+            <a:r>
+              <a:rPr lang="en-US" dirty="0" smtClean="0"/>
+              <a:t>Primary means of containing Entities and Collisions.</a:t>
+            </a:r>
+          </a:p>
+          <a:p>
+            <a:pPr lvl="2"/>
+            <a:r>
+              <a:rPr lang="en-US" dirty="0" smtClean="0"/>
+              <a:t>Easy to use, hard on the rubric.</a:t>
+            </a:r>
+          </a:p>
+          <a:p>
+            <a:pPr lvl="1"/>
+            <a:r>
+              <a:rPr lang="en-US" dirty="0" err="1" smtClean="0"/>
+              <a:t>Enums</a:t>
+            </a:r>
+            <a:r>
+              <a:rPr lang="en-US" dirty="0" smtClean="0"/>
+              <a:t> (c’mon).</a:t>
+            </a:r>
+          </a:p>
+          <a:p>
+            <a:pPr lvl="2"/>
+            <a:r>
+              <a:rPr lang="en-US" dirty="0" smtClean="0"/>
+              <a:t>At least two </a:t>
+            </a:r>
+            <a:r>
+              <a:rPr lang="en-US" dirty="0" err="1" smtClean="0"/>
+              <a:t>enums</a:t>
+            </a:r>
+            <a:r>
+              <a:rPr lang="en-US" dirty="0" smtClean="0"/>
+              <a:t> are defined by the Entity class</a:t>
+            </a:r>
+          </a:p>
+          <a:p>
+            <a:pPr lvl="3"/>
+            <a:r>
+              <a:rPr lang="en-US" dirty="0" smtClean="0"/>
+              <a:t>Direction contains… directions.</a:t>
+            </a:r>
+          </a:p>
+          <a:p>
+            <a:pPr lvl="3"/>
+            <a:r>
+              <a:rPr lang="en-US" dirty="0" smtClean="0"/>
+              <a:t>Shape is used by the </a:t>
+            </a:r>
+            <a:r>
+              <a:rPr lang="en-US" dirty="0" err="1" smtClean="0"/>
+              <a:t>drawEntity</a:t>
+            </a:r>
+            <a:r>
+              <a:rPr lang="en-US" dirty="0" smtClean="0"/>
+              <a:t> method to draw rectangles or circles.</a:t>
+            </a:r>
+          </a:p>
+          <a:p>
+            <a:pPr lvl="1"/>
+            <a:r>
+              <a:rPr lang="en-US" dirty="0" err="1" smtClean="0"/>
+              <a:t>HashMap</a:t>
+            </a:r>
+            <a:r>
+              <a:rPr lang="en-US" dirty="0" smtClean="0"/>
+              <a:t>(s).</a:t>
+            </a:r>
+          </a:p>
+          <a:p>
+            <a:pPr lvl="2"/>
+            <a:r>
+              <a:rPr lang="en-US" dirty="0" smtClean="0"/>
+              <a:t>Pacman uses a </a:t>
+            </a:r>
+            <a:r>
+              <a:rPr lang="en-US" dirty="0" err="1" smtClean="0"/>
+              <a:t>HashMap</a:t>
+            </a:r>
+            <a:r>
+              <a:rPr lang="en-US" dirty="0" smtClean="0"/>
+              <a:t> to alternate between mouth states.</a:t>
+            </a:r>
+          </a:p>
+          <a:p>
+            <a:pPr lvl="3"/>
+            <a:r>
+              <a:rPr lang="en-US" dirty="0" smtClean="0"/>
+              <a:t>Has a Boolean as a key, with an Integer that is used for the arc angle as a value.</a:t>
+            </a:r>
+            <a:endParaRPr lang="en-US" dirty="0"/>
+          </a:p>
+        </p:txBody>
+      </p:sp>
+    </p:spTree>
+    <p:extLst>
+      <p:ext uri="{BB962C8B-B14F-4D97-AF65-F5344CB8AC3E}">
+        <p14:creationId xmlns:p14="http://schemas.microsoft.com/office/powerpoint/2010/main" val="3241910248"/>
+      </p:ext>
+    </p:extLst>
+  </p:cSld>
+  <p:clrMapOvr>
+    <a:masterClrMapping/>
+  </p:clrMapOvr>
+</p:sld>
+</file>
+
+<file path=ppt/slides/slide11.xml><?xml version="1.0" encoding="utf-8"?>
+<p:sld xmlns:a="http://schemas.openxmlformats.org/drawingml/2006/main" xmlns:r="http://schemas.openxmlformats.org/officeDocument/2006/relationships" xmlns:p="http://schemas.openxmlformats.org/presentationml/2006/main">
+  <p:cSld>
+    <p:spTree>
+      <p:nvGrpSpPr>
+        <p:cNvPr id="1" name=""/>
+        <p:cNvGrpSpPr/>
+        <p:nvPr/>
+      </p:nvGrpSpPr>
+      <p:grpSpPr>
+        <a:xfrm>
+          <a:off x="0" y="0"/>
+          <a:ext cx="0" cy="0"/>
+          <a:chOff x="0" y="0"/>
+          <a:chExt cx="0" cy="0"/>
+        </a:xfrm>
+      </p:grpSpPr>
+      <p:sp>
+        <p:nvSpPr>
+          <p:cNvPr id="2" name="Title 1"/>
+          <p:cNvSpPr>
+            <a:spLocks noGrp="1"/>
+          </p:cNvSpPr>
+          <p:nvPr>
+            <p:ph type="title"/>
+          </p:nvPr>
+        </p:nvSpPr>
+        <p:spPr/>
+        <p:txBody>
+          <a:bodyPr/>
+          <a:lstStyle/>
+          <a:p>
+            <a:r>
+              <a:rPr lang="en-US" dirty="0" smtClean="0"/>
+              <a:t>The approach</a:t>
+            </a:r>
+            <a:endParaRPr lang="en-US" dirty="0"/>
+          </a:p>
+        </p:txBody>
+      </p:sp>
+      <p:sp>
+        <p:nvSpPr>
+          <p:cNvPr id="3" name="Content Placeholder 2"/>
+          <p:cNvSpPr>
+            <a:spLocks noGrp="1"/>
+          </p:cNvSpPr>
+          <p:nvPr>
+            <p:ph idx="1"/>
+          </p:nvPr>
+        </p:nvSpPr>
+        <p:spPr/>
+        <p:txBody>
+          <a:bodyPr/>
+          <a:lstStyle/>
+          <a:p>
+            <a:r>
+              <a:rPr lang="en-US" dirty="0" smtClean="0"/>
+              <a:t>Algorithms:</a:t>
+            </a:r>
+          </a:p>
+          <a:p>
+            <a:pPr lvl="1"/>
+            <a:r>
+              <a:rPr lang="en-US" dirty="0" smtClean="0"/>
+              <a:t>Going off the grid.</a:t>
+            </a:r>
+          </a:p>
+          <a:p>
+            <a:pPr lvl="2"/>
+            <a:r>
+              <a:rPr lang="en-US" dirty="0" smtClean="0"/>
+              <a:t>Map is not array based.</a:t>
+            </a:r>
+          </a:p>
+          <a:p>
+            <a:pPr lvl="2"/>
+            <a:r>
+              <a:rPr lang="en-US" dirty="0" smtClean="0"/>
+              <a:t>Entities ‘could’ occupy the same space unlike an array.</a:t>
+            </a:r>
+          </a:p>
+          <a:p>
+            <a:pPr lvl="2"/>
+            <a:r>
+              <a:rPr lang="en-US" dirty="0" smtClean="0"/>
+              <a:t>Complete freedom.</a:t>
+            </a:r>
+          </a:p>
+          <a:p>
+            <a:pPr lvl="1"/>
+            <a:r>
+              <a:rPr lang="en-US" dirty="0" smtClean="0"/>
+              <a:t>Hit Detection.</a:t>
+            </a:r>
+          </a:p>
+          <a:p>
+            <a:pPr lvl="2"/>
+            <a:r>
+              <a:rPr lang="en-US" dirty="0" smtClean="0"/>
+              <a:t>Handling hit detection without checking an array’s neighbor takes work.</a:t>
+            </a:r>
+          </a:p>
+          <a:p>
+            <a:pPr lvl="2"/>
+            <a:r>
+              <a:rPr lang="en-US" dirty="0" smtClean="0"/>
+              <a:t>Check for overlap based on Position2D coordinates and size.</a:t>
+            </a:r>
+          </a:p>
+          <a:p>
+            <a:pPr lvl="2"/>
+            <a:r>
+              <a:rPr lang="en-US" dirty="0" smtClean="0"/>
+              <a:t>Produce appropriate results based on Entity types and overlaps.</a:t>
+            </a:r>
+          </a:p>
+          <a:p>
+            <a:pPr lvl="1"/>
+            <a:r>
+              <a:rPr lang="en-US" dirty="0" smtClean="0"/>
+              <a:t>Seeking Patterns…</a:t>
+            </a:r>
+          </a:p>
+          <a:p>
+            <a:pPr lvl="1"/>
+            <a:endParaRPr lang="en-US" dirty="0"/>
+          </a:p>
+        </p:txBody>
+      </p:sp>
+    </p:spTree>
+    <p:extLst>
+      <p:ext uri="{BB962C8B-B14F-4D97-AF65-F5344CB8AC3E}">
+        <p14:creationId xmlns:p14="http://schemas.microsoft.com/office/powerpoint/2010/main" val="1763505311"/>
+      </p:ext>
+    </p:extLst>
+  </p:cSld>
+  <p:clrMapOvr>
+    <a:masterClrMapping/>
+  </p:clrMapOvr>
+</p:sld>
+</file>
+
+<file path=ppt/slides/slide12.xml><?xml version="1.0" encoding="utf-8"?>
+<p:sld xmlns:a="http://schemas.openxmlformats.org/drawingml/2006/main" xmlns:r="http://schemas.openxmlformats.org/officeDocument/2006/relationships" xmlns:p="http://schemas.openxmlformats.org/presentationml/2006/main">
+  <p:cSld>
+    <p:spTree>
+      <p:nvGrpSpPr>
+        <p:cNvPr id="1" name=""/>
+        <p:cNvGrpSpPr/>
+        <p:nvPr/>
+      </p:nvGrpSpPr>
+      <p:grpSpPr>
+        <a:xfrm>
+          <a:off x="0" y="0"/>
+          <a:ext cx="0" cy="0"/>
+          <a:chOff x="0" y="0"/>
+          <a:chExt cx="0" cy="0"/>
+        </a:xfrm>
+      </p:grpSpPr>
+      <p:sp>
+        <p:nvSpPr>
+          <p:cNvPr id="2" name="Title 1"/>
+          <p:cNvSpPr>
+            <a:spLocks noGrp="1"/>
+          </p:cNvSpPr>
+          <p:nvPr>
+            <p:ph type="title"/>
+          </p:nvPr>
+        </p:nvSpPr>
+        <p:spPr/>
+        <p:txBody>
+          <a:bodyPr/>
+          <a:lstStyle/>
+          <a:p>
+            <a:r>
+              <a:rPr lang="en-US" dirty="0" smtClean="0"/>
+              <a:t>The approach</a:t>
+            </a:r>
+            <a:endParaRPr lang="en-US" dirty="0"/>
+          </a:p>
+        </p:txBody>
+      </p:sp>
+      <p:sp>
+        <p:nvSpPr>
+          <p:cNvPr id="3" name="Content Placeholder 2"/>
+          <p:cNvSpPr>
+            <a:spLocks noGrp="1"/>
+          </p:cNvSpPr>
+          <p:nvPr>
+            <p:ph idx="1"/>
+          </p:nvPr>
+        </p:nvSpPr>
+        <p:spPr/>
+        <p:txBody>
+          <a:bodyPr/>
+          <a:lstStyle/>
+          <a:p>
+            <a:r>
+              <a:rPr lang="en-US" dirty="0" smtClean="0"/>
+              <a:t>Seeking Patterns For Real This Time:</a:t>
+            </a:r>
+          </a:p>
+          <a:p>
+            <a:pPr lvl="1"/>
+            <a:r>
+              <a:rPr lang="en-US" dirty="0" smtClean="0"/>
+              <a:t>Huge aspect of what makes the game tick.</a:t>
+            </a:r>
+          </a:p>
+          <a:p>
+            <a:pPr lvl="1"/>
+            <a:r>
+              <a:rPr lang="en-US" dirty="0" smtClean="0"/>
+              <a:t>Multiple patterns to make the ghosts unique.</a:t>
+            </a:r>
+          </a:p>
+          <a:p>
+            <a:pPr lvl="2"/>
+            <a:r>
+              <a:rPr lang="en-US" dirty="0" smtClean="0"/>
+              <a:t>Straight at you!</a:t>
+            </a:r>
+          </a:p>
+          <a:p>
+            <a:pPr lvl="2"/>
+            <a:r>
+              <a:rPr lang="en-US" dirty="0" smtClean="0"/>
+              <a:t>Stop mirroring me!</a:t>
+            </a:r>
+          </a:p>
+          <a:p>
+            <a:pPr lvl="2"/>
+            <a:r>
+              <a:rPr lang="en-US" dirty="0" smtClean="0"/>
+              <a:t>Teleporting! Game over man!</a:t>
+            </a:r>
+          </a:p>
+          <a:p>
+            <a:pPr lvl="1"/>
+            <a:r>
+              <a:rPr lang="en-US" dirty="0" smtClean="0"/>
+              <a:t>Having difficulty getting over that wall.</a:t>
+            </a:r>
+          </a:p>
+          <a:p>
+            <a:pPr lvl="1"/>
+            <a:r>
+              <a:rPr lang="en-US" dirty="0" smtClean="0"/>
+              <a:t>Ghosts camp like pros.</a:t>
+            </a:r>
+          </a:p>
+          <a:p>
+            <a:pPr lvl="1"/>
+            <a:r>
+              <a:rPr lang="en-US" dirty="0" smtClean="0"/>
+              <a:t>Largely written by the person not writing this slide.</a:t>
+            </a:r>
+          </a:p>
+          <a:p>
+            <a:pPr lvl="1"/>
+            <a:endParaRPr lang="en-US" dirty="0" smtClean="0"/>
+          </a:p>
+          <a:p>
+            <a:pPr lvl="1"/>
+            <a:endParaRPr lang="en-US" dirty="0" smtClean="0"/>
+          </a:p>
+          <a:p>
+            <a:pPr lvl="1"/>
+            <a:endParaRPr lang="en-US" dirty="0" smtClean="0"/>
+          </a:p>
+        </p:txBody>
+      </p:sp>
+    </p:spTree>
+    <p:extLst>
+      <p:ext uri="{BB962C8B-B14F-4D97-AF65-F5344CB8AC3E}">
+        <p14:creationId xmlns:p14="http://schemas.microsoft.com/office/powerpoint/2010/main" val="584755075"/>
+      </p:ext>
+    </p:extLst>
+  </p:cSld>
+  <p:clrMapOvr>
+    <a:masterClrMapping/>
+  </p:clrMapOvr>
+</p:sld>
+</file>
+
+<file path=ppt/slides/slide13.xml><?xml version="1.0" encoding="utf-8"?>
+<p:sld xmlns:a="http://schemas.openxmlformats.org/drawingml/2006/main" xmlns:r="http://schemas.openxmlformats.org/officeDocument/2006/relationships" xmlns:p="http://schemas.openxmlformats.org/presentationml/2006/main">
+  <p:cSld>
+    <p:spTree>
+      <p:nvGrpSpPr>
+        <p:cNvPr id="1" name=""/>
+        <p:cNvGrpSpPr/>
+        <p:nvPr/>
+      </p:nvGrpSpPr>
+      <p:grpSpPr>
+        <a:xfrm>
+          <a:off x="0" y="0"/>
+          <a:ext cx="0" cy="0"/>
+          <a:chOff x="0" y="0"/>
+          <a:chExt cx="0" cy="0"/>
+        </a:xfrm>
+      </p:grpSpPr>
+      <p:sp>
+        <p:nvSpPr>
+          <p:cNvPr id="2" name="Title 1"/>
+          <p:cNvSpPr>
+            <a:spLocks noGrp="1"/>
+          </p:cNvSpPr>
+          <p:nvPr>
+            <p:ph type="title"/>
+          </p:nvPr>
+        </p:nvSpPr>
+        <p:spPr/>
+        <p:txBody>
+          <a:bodyPr/>
+          <a:lstStyle/>
+          <a:p>
+            <a:r>
+              <a:rPr lang="en-US" dirty="0" smtClean="0"/>
+              <a:t>The result</a:t>
+            </a:r>
+            <a:endParaRPr lang="en-US" dirty="0"/>
+          </a:p>
+        </p:txBody>
+      </p:sp>
+      <p:pic>
+        <p:nvPicPr>
+          <p:cNvPr id="4" name="Content Placeholder 3"/>
+          <p:cNvPicPr>
+            <a:picLocks noGrp="1" noChangeAspect="1"/>
+          </p:cNvPicPr>
+          <p:nvPr>
+            <p:ph idx="1"/>
+          </p:nvPr>
+        </p:nvPicPr>
+        <p:blipFill>
+          <a:blip r:embed="rId2">
+            <a:extLst>
+              <a:ext uri="{28A0092B-C50C-407E-A947-70E740481C1C}">
+                <a14:useLocalDpi xmlns:a14="http://schemas.microsoft.com/office/drawing/2010/main" val="0"/>
+              </a:ext>
+            </a:extLst>
+          </a:blip>
+          <a:stretch>
+            <a:fillRect/>
+          </a:stretch>
+        </p:blipFill>
+        <p:spPr>
+          <a:xfrm>
+            <a:off x="2157596" y="1326823"/>
+            <a:ext cx="7315200" cy="4488186"/>
+          </a:xfrm>
+        </p:spPr>
+      </p:pic>
+    </p:spTree>
+    <p:extLst>
+      <p:ext uri="{BB962C8B-B14F-4D97-AF65-F5344CB8AC3E}">
+        <p14:creationId xmlns:p14="http://schemas.microsoft.com/office/powerpoint/2010/main" val="3738444192"/>
+      </p:ext>
+    </p:extLst>
+  </p:cSld>
+  <p:clrMapOvr>
+    <a:masterClrMapping/>
+  </p:clrMapOvr>
+</p:sld>
+</file>
+
+<file path=ppt/slides/slide14.xml><?xml version="1.0" encoding="utf-8"?>
+<p:sld xmlns:a="http://schemas.openxmlformats.org/drawingml/2006/main" xmlns:r="http://schemas.openxmlformats.org/officeDocument/2006/relationships" xmlns:p="http://schemas.openxmlformats.org/presentationml/2006/main">
+  <p:cSld>
+    <p:spTree>
+      <p:nvGrpSpPr>
+        <p:cNvPr id="1" name=""/>
+        <p:cNvGrpSpPr/>
+        <p:nvPr/>
+      </p:nvGrpSpPr>
+      <p:grpSpPr>
+        <a:xfrm>
+          <a:off x="0" y="0"/>
+          <a:ext cx="0" cy="0"/>
+          <a:chOff x="0" y="0"/>
+          <a:chExt cx="0" cy="0"/>
+        </a:xfrm>
+      </p:grpSpPr>
+      <p:sp>
+        <p:nvSpPr>
+          <p:cNvPr id="2" name="Title 1"/>
+          <p:cNvSpPr>
+            <a:spLocks noGrp="1"/>
+          </p:cNvSpPr>
+          <p:nvPr>
+            <p:ph type="title"/>
+          </p:nvPr>
+        </p:nvSpPr>
+        <p:spPr/>
+        <p:txBody>
+          <a:bodyPr/>
+          <a:lstStyle/>
+          <a:p>
+            <a:r>
+              <a:rPr lang="en-US" dirty="0" smtClean="0"/>
+              <a:t>The result</a:t>
+            </a:r>
+            <a:endParaRPr lang="en-US" dirty="0"/>
+          </a:p>
+        </p:txBody>
+      </p:sp>
+      <p:pic>
+        <p:nvPicPr>
+          <p:cNvPr id="4" name="Content Placeholder 3"/>
+          <p:cNvPicPr>
+            <a:picLocks noGrp="1" noChangeAspect="1"/>
+          </p:cNvPicPr>
+          <p:nvPr>
+            <p:ph idx="1"/>
+          </p:nvPr>
+        </p:nvPicPr>
+        <p:blipFill>
+          <a:blip r:embed="rId2">
+            <a:extLst>
+              <a:ext uri="{28A0092B-C50C-407E-A947-70E740481C1C}">
+                <a14:useLocalDpi xmlns:a14="http://schemas.microsoft.com/office/drawing/2010/main" val="0"/>
+              </a:ext>
+            </a:extLst>
+          </a:blip>
+          <a:stretch>
+            <a:fillRect/>
+          </a:stretch>
+        </p:blipFill>
+        <p:spPr>
+          <a:xfrm>
+            <a:off x="2157596" y="1325880"/>
+            <a:ext cx="7315200" cy="4488187"/>
+          </a:xfrm>
+        </p:spPr>
+      </p:pic>
+    </p:spTree>
+    <p:extLst>
+      <p:ext uri="{BB962C8B-B14F-4D97-AF65-F5344CB8AC3E}">
+        <p14:creationId xmlns:p14="http://schemas.microsoft.com/office/powerpoint/2010/main" val="930792107"/>
+      </p:ext>
+    </p:extLst>
+  </p:cSld>
+  <p:clrMapOvr>
+    <a:masterClrMapping/>
+  </p:clrMapOvr>
+</p:sld>
+</file>
+
+<file path=ppt/slides/slide15.xml><?xml version="1.0" encoding="utf-8"?>
+<p:sld xmlns:a="http://schemas.openxmlformats.org/drawingml/2006/main" xmlns:r="http://schemas.openxmlformats.org/officeDocument/2006/relationships" xmlns:p="http://schemas.openxmlformats.org/presentationml/2006/main">
+  <p:cSld>
+    <p:spTree>
+      <p:nvGrpSpPr>
+        <p:cNvPr id="1" name=""/>
+        <p:cNvGrpSpPr/>
+        <p:nvPr/>
+      </p:nvGrpSpPr>
+      <p:grpSpPr>
+        <a:xfrm>
+          <a:off x="0" y="0"/>
+          <a:ext cx="0" cy="0"/>
+          <a:chOff x="0" y="0"/>
+          <a:chExt cx="0" cy="0"/>
+        </a:xfrm>
+      </p:grpSpPr>
+      <p:sp>
+        <p:nvSpPr>
+          <p:cNvPr id="2" name="Title 1"/>
+          <p:cNvSpPr>
+            <a:spLocks noGrp="1"/>
+          </p:cNvSpPr>
+          <p:nvPr>
+            <p:ph type="title"/>
+          </p:nvPr>
+        </p:nvSpPr>
+        <p:spPr/>
+        <p:txBody>
+          <a:bodyPr/>
+          <a:lstStyle/>
+          <a:p>
+            <a:r>
+              <a:rPr lang="en-US" dirty="0" smtClean="0"/>
               <a:t>The result</a:t>
             </a:r>
             <a:endParaRPr lang="en-US" dirty="0"/>
@@ -7312,8 +7980,59 @@
               <a:t>SystemManager</a:t>
             </a:r>
             <a:r>
-              <a:rPr lang="en-US" smtClean="0"/>
+              <a:rPr lang="en-US" dirty="0" smtClean="0"/>
               <a:t> Class:</a:t>
+            </a:r>
+          </a:p>
+          <a:p>
+            <a:pPr lvl="1"/>
+            <a:r>
+              <a:rPr lang="en-US" dirty="0" smtClean="0"/>
+              <a:t>Primary controller.</a:t>
+            </a:r>
+          </a:p>
+          <a:p>
+            <a:pPr lvl="1"/>
+            <a:r>
+              <a:rPr lang="en-US" dirty="0" smtClean="0"/>
+              <a:t>Initializes entities.</a:t>
+            </a:r>
+          </a:p>
+          <a:p>
+            <a:pPr lvl="1"/>
+            <a:r>
+              <a:rPr lang="en-US" dirty="0" smtClean="0"/>
+              <a:t>Records details like coin and cherry scores.</a:t>
+            </a:r>
+          </a:p>
+          <a:p>
+            <a:pPr lvl="1"/>
+            <a:r>
+              <a:rPr lang="en-US" dirty="0" smtClean="0"/>
+              <a:t>Has </a:t>
+            </a:r>
+            <a:r>
+              <a:rPr lang="en-US" dirty="0" err="1" smtClean="0"/>
+              <a:t>PlayerController</a:t>
+            </a:r>
+            <a:r>
+              <a:rPr lang="en-US" dirty="0" smtClean="0"/>
+              <a:t>, a nested class that implements </a:t>
+            </a:r>
+            <a:r>
+              <a:rPr lang="en-US" dirty="0" err="1" smtClean="0"/>
+              <a:t>KeyListener</a:t>
+            </a:r>
+            <a:r>
+              <a:rPr lang="en-US" dirty="0" smtClean="0"/>
+              <a:t>.</a:t>
+            </a:r>
+          </a:p>
+          <a:p>
+            <a:pPr lvl="1"/>
+            <a:r>
+              <a:rPr lang="en-US" dirty="0" smtClean="0"/>
+              <a:t>Responsible for some hit detection.</a:t>
             </a:r>
             <a:endParaRPr lang="en-US" dirty="0"/>
           </a:p>
@@ -7322,7 +8041,7 @@
     </p:spTree>
     <p:extLst>
       <p:ext uri="{BB962C8B-B14F-4D97-AF65-F5344CB8AC3E}">
-        <p14:creationId xmlns:p14="http://schemas.microsoft.com/office/powerpoint/2010/main" val="888720240"/>
+        <p14:creationId xmlns:p14="http://schemas.microsoft.com/office/powerpoint/2010/main" val="492253604"/>
       </p:ext>
     </p:extLst>
   </p:cSld>
@@ -7366,45 +8085,143 @@
           <a:p>
             <a:r>
               <a:rPr lang="en-US" dirty="0" smtClean="0"/>
-              <a:t>The result</a:t>
-            </a:r>
-            <a:endParaRPr lang="en-US" dirty="0"/>
-          </a:p>
-        </p:txBody>
-      </p:sp>
-      <p:pic>
-        <p:nvPicPr>
-          <p:cNvPr id="4" name="Content Placeholder 3"/>
-          <p:cNvPicPr>
-            <a:picLocks noGrp="1" noChangeAspect="1"/>
-          </p:cNvPicPr>
+              <a:t>The approach</a:t>
+            </a:r>
+            <a:endParaRPr lang="en-US" dirty="0"/>
+          </a:p>
+        </p:txBody>
+      </p:sp>
+      <p:sp>
+        <p:nvSpPr>
+          <p:cNvPr id="3" name="Content Placeholder 2"/>
+          <p:cNvSpPr>
+            <a:spLocks noGrp="1"/>
+          </p:cNvSpPr>
           <p:nvPr>
             <p:ph idx="1"/>
           </p:nvPr>
-        </p:nvPicPr>
-        <p:blipFill>
-          <a:blip r:embed="rId2">
-            <a:extLst>
-              <a:ext uri="{28A0092B-C50C-407E-A947-70E740481C1C}">
-                <a14:useLocalDpi xmlns:a14="http://schemas.microsoft.com/office/drawing/2010/main" val="0"/>
-              </a:ext>
-            </a:extLst>
-          </a:blip>
-          <a:stretch>
-            <a:fillRect/>
-          </a:stretch>
-        </p:blipFill>
-        <p:spPr>
-          <a:xfrm>
-            <a:off x="2157596" y="1326823"/>
-            <a:ext cx="7315200" cy="4488186"/>
-          </a:xfrm>
-        </p:spPr>
-      </p:pic>
+        </p:nvSpPr>
+        <p:spPr/>
+        <p:txBody>
+          <a:bodyPr/>
+          <a:lstStyle/>
+          <a:p>
+            <a:r>
+              <a:rPr lang="en-US" dirty="0" smtClean="0"/>
+              <a:t>The </a:t>
+            </a:r>
+            <a:r>
+              <a:rPr lang="en-US" dirty="0" err="1" smtClean="0"/>
+              <a:t>GraphicsController</a:t>
+            </a:r>
+            <a:r>
+              <a:rPr lang="en-US" dirty="0" smtClean="0"/>
+              <a:t> Class:</a:t>
+            </a:r>
+          </a:p>
+          <a:p>
+            <a:pPr lvl="1"/>
+            <a:r>
+              <a:rPr lang="en-US" dirty="0" smtClean="0"/>
+              <a:t>Extends </a:t>
+            </a:r>
+            <a:r>
+              <a:rPr lang="en-US" dirty="0" err="1" smtClean="0"/>
+              <a:t>JFrame</a:t>
+            </a:r>
+            <a:r>
+              <a:rPr lang="en-US" dirty="0" smtClean="0"/>
+              <a:t> to use swing.</a:t>
+            </a:r>
+          </a:p>
+          <a:p>
+            <a:pPr lvl="1"/>
+            <a:r>
+              <a:rPr lang="en-US" dirty="0" smtClean="0"/>
+              <a:t>Creates an environment for the graphics to be displayed.</a:t>
+            </a:r>
+          </a:p>
+          <a:p>
+            <a:pPr lvl="1"/>
+            <a:r>
+              <a:rPr lang="en-US" dirty="0" smtClean="0"/>
+              <a:t>Uses a </a:t>
+            </a:r>
+            <a:r>
+              <a:rPr lang="en-US" dirty="0" err="1" smtClean="0"/>
+              <a:t>BorderLayout</a:t>
+            </a:r>
+            <a:r>
+              <a:rPr lang="en-US" dirty="0" smtClean="0"/>
+              <a:t>.</a:t>
+            </a:r>
+          </a:p>
+          <a:p>
+            <a:pPr lvl="1"/>
+            <a:r>
+              <a:rPr lang="en-US" dirty="0" smtClean="0"/>
+              <a:t>Uses witchcraft threading to redraw.</a:t>
+            </a:r>
+          </a:p>
+          <a:p>
+            <a:pPr lvl="1"/>
+            <a:r>
+              <a:rPr lang="en-US" dirty="0" smtClean="0"/>
+              <a:t>Has a </a:t>
+            </a:r>
+            <a:r>
+              <a:rPr lang="en-US" dirty="0" err="1" smtClean="0"/>
+              <a:t>SystemManager</a:t>
+            </a:r>
+            <a:r>
+              <a:rPr lang="en-US" dirty="0" smtClean="0"/>
+              <a:t> object.</a:t>
+            </a:r>
+          </a:p>
+          <a:p>
+            <a:pPr lvl="1"/>
+            <a:r>
+              <a:rPr lang="en-US" dirty="0" smtClean="0"/>
+              <a:t>Uses </a:t>
+            </a:r>
+            <a:r>
+              <a:rPr lang="en-US" dirty="0" err="1" smtClean="0"/>
+              <a:t>SystemManager’s</a:t>
+            </a:r>
+            <a:r>
+              <a:rPr lang="en-US" dirty="0" smtClean="0"/>
+              <a:t> </a:t>
+            </a:r>
+            <a:r>
+              <a:rPr lang="en-US" dirty="0" err="1" smtClean="0"/>
+              <a:t>PlayerListener</a:t>
+            </a:r>
+            <a:r>
+              <a:rPr lang="en-US" dirty="0" smtClean="0"/>
+              <a:t>.</a:t>
+            </a:r>
+          </a:p>
+          <a:p>
+            <a:pPr lvl="1"/>
+            <a:r>
+              <a:rPr lang="en-US" dirty="0" smtClean="0"/>
+              <a:t>Has a </a:t>
+            </a:r>
+            <a:r>
+              <a:rPr lang="en-US" dirty="0" err="1" smtClean="0"/>
+              <a:t>CenterPanel</a:t>
+            </a:r>
+            <a:r>
+              <a:rPr lang="en-US" dirty="0" smtClean="0"/>
+              <a:t>…</a:t>
+            </a:r>
+          </a:p>
+        </p:txBody>
+      </p:sp>
     </p:spTree>
     <p:extLst>
       <p:ext uri="{BB962C8B-B14F-4D97-AF65-F5344CB8AC3E}">
-        <p14:creationId xmlns:p14="http://schemas.microsoft.com/office/powerpoint/2010/main" val="3738444192"/>
+        <p14:creationId xmlns:p14="http://schemas.microsoft.com/office/powerpoint/2010/main" val="398846794"/>
       </p:ext>
     </p:extLst>
   </p:cSld>
@@ -7448,45 +8265,157 @@
           <a:p>
             <a:r>
               <a:rPr lang="en-US" dirty="0" smtClean="0"/>
-              <a:t>The result</a:t>
-            </a:r>
-            <a:endParaRPr lang="en-US" dirty="0"/>
-          </a:p>
-        </p:txBody>
-      </p:sp>
-      <p:pic>
-        <p:nvPicPr>
-          <p:cNvPr id="4" name="Content Placeholder 3"/>
-          <p:cNvPicPr>
-            <a:picLocks noGrp="1" noChangeAspect="1"/>
-          </p:cNvPicPr>
+              <a:t>The approach</a:t>
+            </a:r>
+            <a:endParaRPr lang="en-US" dirty="0"/>
+          </a:p>
+        </p:txBody>
+      </p:sp>
+      <p:sp>
+        <p:nvSpPr>
+          <p:cNvPr id="3" name="Content Placeholder 2"/>
+          <p:cNvSpPr>
+            <a:spLocks noGrp="1"/>
+          </p:cNvSpPr>
           <p:nvPr>
             <p:ph idx="1"/>
           </p:nvPr>
-        </p:nvPicPr>
-        <p:blipFill>
-          <a:blip r:embed="rId2">
-            <a:extLst>
-              <a:ext uri="{28A0092B-C50C-407E-A947-70E740481C1C}">
-                <a14:useLocalDpi xmlns:a14="http://schemas.microsoft.com/office/drawing/2010/main" val="0"/>
-              </a:ext>
-            </a:extLst>
-          </a:blip>
-          <a:stretch>
-            <a:fillRect/>
-          </a:stretch>
-        </p:blipFill>
-        <p:spPr>
-          <a:xfrm>
-            <a:off x="2157596" y="1325880"/>
-            <a:ext cx="7315200" cy="4488187"/>
-          </a:xfrm>
-        </p:spPr>
-      </p:pic>
+        </p:nvSpPr>
+        <p:spPr/>
+        <p:txBody>
+          <a:bodyPr/>
+          <a:lstStyle/>
+          <a:p>
+            <a:r>
+              <a:rPr lang="en-US" dirty="0" smtClean="0"/>
+              <a:t>The </a:t>
+            </a:r>
+            <a:r>
+              <a:rPr lang="en-US" dirty="0" err="1" smtClean="0"/>
+              <a:t>CenterPanel</a:t>
+            </a:r>
+            <a:r>
+              <a:rPr lang="en-US" dirty="0" smtClean="0"/>
+              <a:t> Class:</a:t>
+            </a:r>
+          </a:p>
+          <a:p>
+            <a:pPr lvl="1"/>
+            <a:r>
+              <a:rPr lang="en-US" dirty="0" smtClean="0"/>
+              <a:t>Responsible for drawing the pixels we care about.</a:t>
+            </a:r>
+          </a:p>
+          <a:p>
+            <a:pPr lvl="1"/>
+            <a:r>
+              <a:rPr lang="en-US" dirty="0" smtClean="0"/>
+              <a:t>Extends </a:t>
+            </a:r>
+            <a:r>
+              <a:rPr lang="en-US" dirty="0" err="1" smtClean="0"/>
+              <a:t>JPanel</a:t>
+            </a:r>
+            <a:r>
+              <a:rPr lang="en-US" dirty="0"/>
+              <a:t> </a:t>
+            </a:r>
+            <a:r>
+              <a:rPr lang="en-US" dirty="0" smtClean="0"/>
+              <a:t>with a constructor that accepts an </a:t>
+            </a:r>
+            <a:r>
+              <a:rPr lang="en-US" dirty="0" err="1" smtClean="0"/>
+              <a:t>ArrayList</a:t>
+            </a:r>
+            <a:r>
+              <a:rPr lang="en-US" dirty="0" smtClean="0"/>
+              <a:t> of Entity.</a:t>
+            </a:r>
+          </a:p>
+          <a:p>
+            <a:pPr lvl="1"/>
+            <a:r>
+              <a:rPr lang="en-US" dirty="0" smtClean="0"/>
+              <a:t>Is used by </a:t>
+            </a:r>
+            <a:r>
+              <a:rPr lang="en-US" dirty="0" err="1" smtClean="0"/>
+              <a:t>GraphicsController</a:t>
+            </a:r>
+            <a:r>
+              <a:rPr lang="en-US" dirty="0" smtClean="0"/>
+              <a:t> in the center of the </a:t>
+            </a:r>
+            <a:r>
+              <a:rPr lang="en-US" dirty="0" err="1" smtClean="0"/>
+              <a:t>BorderLayout</a:t>
+            </a:r>
+            <a:r>
+              <a:rPr lang="en-US" dirty="0" smtClean="0"/>
+              <a:t>.</a:t>
+            </a:r>
+          </a:p>
+          <a:p>
+            <a:pPr lvl="1"/>
+            <a:r>
+              <a:rPr lang="en-US" dirty="0" smtClean="0"/>
+              <a:t>Has the </a:t>
+            </a:r>
+            <a:r>
+              <a:rPr lang="en-US" dirty="0" err="1" smtClean="0"/>
+              <a:t>GraphicsController’s</a:t>
+            </a:r>
+            <a:r>
+              <a:rPr lang="en-US" dirty="0" smtClean="0"/>
+              <a:t> </a:t>
+            </a:r>
+            <a:r>
+              <a:rPr lang="en-US" dirty="0" err="1" smtClean="0"/>
+              <a:t>SystemManager’s</a:t>
+            </a:r>
+            <a:r>
+              <a:rPr lang="en-US" dirty="0" smtClean="0"/>
+              <a:t> Entity </a:t>
+            </a:r>
+            <a:r>
+              <a:rPr lang="en-US" dirty="0" err="1" smtClean="0"/>
+              <a:t>ArrayLIst</a:t>
+            </a:r>
+            <a:r>
+              <a:rPr lang="en-US" dirty="0" smtClean="0"/>
+              <a:t> passed.</a:t>
+            </a:r>
+          </a:p>
+          <a:p>
+            <a:pPr lvl="1"/>
+            <a:r>
+              <a:rPr lang="en-US" dirty="0" smtClean="0"/>
+              <a:t>Iterates over the </a:t>
+            </a:r>
+            <a:r>
+              <a:rPr lang="en-US" dirty="0" err="1" smtClean="0"/>
+              <a:t>ArrayList</a:t>
+            </a:r>
+            <a:r>
+              <a:rPr lang="en-US" dirty="0" smtClean="0"/>
+              <a:t> of Entity and calls each entity’s </a:t>
+            </a:r>
+            <a:r>
+              <a:rPr lang="en-US" dirty="0" err="1" smtClean="0"/>
+              <a:t>drawEntity</a:t>
+            </a:r>
+            <a:r>
+              <a:rPr lang="en-US" dirty="0" smtClean="0"/>
+              <a:t>.</a:t>
+            </a:r>
+          </a:p>
+        </p:txBody>
+      </p:sp>
     </p:spTree>
     <p:extLst>
       <p:ext uri="{BB962C8B-B14F-4D97-AF65-F5344CB8AC3E}">
-        <p14:creationId xmlns:p14="http://schemas.microsoft.com/office/powerpoint/2010/main" val="930792107"/>
+        <p14:creationId xmlns:p14="http://schemas.microsoft.com/office/powerpoint/2010/main" val="76388706"/>
       </p:ext>
     </p:extLst>
   </p:cSld>

</xml_diff>